<commit_message>
DeveloperGuide: Update view month sequence diagram
</commit_message>
<xml_diff>
--- a/docs/diagrams/ViewMonthSequenceDiagram.pptx
+++ b/docs/diagrams/ViewMonthSequenceDiagram.pptx
@@ -208,7 +208,7 @@
           <a:p>
             <a:fld id="{F5CC4B3F-88C1-4FFA-B1B6-F41C21DC6924}" type="datetimeFigureOut">
               <a:rPr lang="en-US" smtClean="0"/>
-              <a:t>4/1/2019</a:t>
+              <a:t>4/13/2019</a:t>
             </a:fld>
             <a:endParaRPr lang="en-US"/>
           </a:p>
@@ -738,7 +738,7 @@
           <a:p>
             <a:fld id="{78C97017-6FC3-485B-9764-EAC9E56C1D49}" type="datetimeFigureOut">
               <a:rPr lang="en-US" smtClean="0"/>
-              <a:t>4/1/2019</a:t>
+              <a:t>4/13/2019</a:t>
             </a:fld>
             <a:endParaRPr lang="en-US"/>
           </a:p>
@@ -906,7 +906,7 @@
           <a:p>
             <a:fld id="{78C97017-6FC3-485B-9764-EAC9E56C1D49}" type="datetimeFigureOut">
               <a:rPr lang="en-US" smtClean="0"/>
-              <a:t>4/1/2019</a:t>
+              <a:t>4/13/2019</a:t>
             </a:fld>
             <a:endParaRPr lang="en-US"/>
           </a:p>
@@ -1084,7 +1084,7 @@
           <a:p>
             <a:fld id="{78C97017-6FC3-485B-9764-EAC9E56C1D49}" type="datetimeFigureOut">
               <a:rPr lang="en-US" smtClean="0"/>
-              <a:t>4/1/2019</a:t>
+              <a:t>4/13/2019</a:t>
             </a:fld>
             <a:endParaRPr lang="en-US"/>
           </a:p>
@@ -1252,7 +1252,7 @@
           <a:p>
             <a:fld id="{78C97017-6FC3-485B-9764-EAC9E56C1D49}" type="datetimeFigureOut">
               <a:rPr lang="en-US" smtClean="0"/>
-              <a:t>4/1/2019</a:t>
+              <a:t>4/13/2019</a:t>
             </a:fld>
             <a:endParaRPr lang="en-US"/>
           </a:p>
@@ -1497,7 +1497,7 @@
           <a:p>
             <a:fld id="{78C97017-6FC3-485B-9764-EAC9E56C1D49}" type="datetimeFigureOut">
               <a:rPr lang="en-US" smtClean="0"/>
-              <a:t>4/1/2019</a:t>
+              <a:t>4/13/2019</a:t>
             </a:fld>
             <a:endParaRPr lang="en-US"/>
           </a:p>
@@ -1782,7 +1782,7 @@
           <a:p>
             <a:fld id="{78C97017-6FC3-485B-9764-EAC9E56C1D49}" type="datetimeFigureOut">
               <a:rPr lang="en-US" smtClean="0"/>
-              <a:t>4/1/2019</a:t>
+              <a:t>4/13/2019</a:t>
             </a:fld>
             <a:endParaRPr lang="en-US"/>
           </a:p>
@@ -2201,7 +2201,7 @@
           <a:p>
             <a:fld id="{78C97017-6FC3-485B-9764-EAC9E56C1D49}" type="datetimeFigureOut">
               <a:rPr lang="en-US" smtClean="0"/>
-              <a:t>4/1/2019</a:t>
+              <a:t>4/13/2019</a:t>
             </a:fld>
             <a:endParaRPr lang="en-US"/>
           </a:p>
@@ -2318,7 +2318,7 @@
           <a:p>
             <a:fld id="{78C97017-6FC3-485B-9764-EAC9E56C1D49}" type="datetimeFigureOut">
               <a:rPr lang="en-US" smtClean="0"/>
-              <a:t>4/1/2019</a:t>
+              <a:t>4/13/2019</a:t>
             </a:fld>
             <a:endParaRPr lang="en-US"/>
           </a:p>
@@ -2413,7 +2413,7 @@
           <a:p>
             <a:fld id="{78C97017-6FC3-485B-9764-EAC9E56C1D49}" type="datetimeFigureOut">
               <a:rPr lang="en-US" smtClean="0"/>
-              <a:t>4/1/2019</a:t>
+              <a:t>4/13/2019</a:t>
             </a:fld>
             <a:endParaRPr lang="en-US"/>
           </a:p>
@@ -2688,7 +2688,7 @@
           <a:p>
             <a:fld id="{78C97017-6FC3-485B-9764-EAC9E56C1D49}" type="datetimeFigureOut">
               <a:rPr lang="en-US" smtClean="0"/>
-              <a:t>4/1/2019</a:t>
+              <a:t>4/13/2019</a:t>
             </a:fld>
             <a:endParaRPr lang="en-US"/>
           </a:p>
@@ -2940,7 +2940,7 @@
           <a:p>
             <a:fld id="{78C97017-6FC3-485B-9764-EAC9E56C1D49}" type="datetimeFigureOut">
               <a:rPr lang="en-US" smtClean="0"/>
-              <a:t>4/1/2019</a:t>
+              <a:t>4/13/2019</a:t>
             </a:fld>
             <a:endParaRPr lang="en-US"/>
           </a:p>
@@ -3151,7 +3151,7 @@
           <a:p>
             <a:fld id="{78C97017-6FC3-485B-9764-EAC9E56C1D49}" type="datetimeFigureOut">
               <a:rPr lang="en-US" smtClean="0"/>
-              <a:t>4/1/2019</a:t>
+              <a:t>4/13/2019</a:t>
             </a:fld>
             <a:endParaRPr lang="en-US"/>
           </a:p>
@@ -3528,25 +3528,34 @@
       </p:grpSpPr>
       <p:sp>
         <p:nvSpPr>
-          <p:cNvPr id="2" name="Rectangle 62"/>
+          <p:cNvPr id="32" name="Rectangle 65">
+            <a:extLst>
+              <a:ext uri="{FF2B5EF4-FFF2-40B4-BE49-F238E27FC236}">
+                <a16:creationId xmlns:a16="http://schemas.microsoft.com/office/drawing/2014/main" id="{A0A27354-6DDE-4B22-8209-DDE049FDFEB0}"/>
+              </a:ext>
+            </a:extLst>
+          </p:cNvPr>
           <p:cNvSpPr/>
           <p:nvPr/>
         </p:nvSpPr>
         <p:spPr>
           <a:xfrm>
-            <a:off x="1905000" y="2209800"/>
-            <a:ext cx="1093635" cy="346760"/>
-          </a:xfrm>
-          <a:prstGeom prst="rect">
-            <a:avLst/>
+            <a:off x="722563" y="1905003"/>
+            <a:ext cx="9200548" cy="4876793"/>
+          </a:xfrm>
+          <a:prstGeom prst="roundRect">
+            <a:avLst>
+              <a:gd name="adj" fmla="val 3484"/>
+            </a:avLst>
           </a:prstGeom>
           <a:solidFill>
-            <a:srgbClr val="00B050"/>
+            <a:schemeClr val="accent1">
+              <a:lumMod val="20000"/>
+              <a:lumOff val="80000"/>
+            </a:schemeClr>
           </a:solidFill>
           <a:ln w="19050">
-            <a:solidFill>
-              <a:srgbClr val="00B050"/>
-            </a:solidFill>
+            <a:noFill/>
           </a:ln>
           <a:effectLst/>
         </p:spPr>
@@ -3565,6 +3574,64 @@
           </a:fontRef>
         </p:style>
         <p:txBody>
+          <a:bodyPr rtlCol="0" anchor="t"/>
+          <a:lstStyle/>
+          <a:p>
+            <a:r>
+              <a:rPr lang="en-US" sz="1200" b="1" dirty="0">
+                <a:solidFill>
+                  <a:srgbClr val="0070C0"/>
+                </a:solidFill>
+              </a:rPr>
+              <a:t>Logic</a:t>
+            </a:r>
+            <a:endParaRPr lang="en-SG" sz="1200" b="1" dirty="0">
+              <a:solidFill>
+                <a:srgbClr val="0070C0"/>
+              </a:solidFill>
+            </a:endParaRPr>
+          </a:p>
+        </p:txBody>
+      </p:sp>
+      <p:sp>
+        <p:nvSpPr>
+          <p:cNvPr id="2" name="Rectangle 62"/>
+          <p:cNvSpPr/>
+          <p:nvPr/>
+        </p:nvSpPr>
+        <p:spPr>
+          <a:xfrm>
+            <a:off x="-473340" y="2209800"/>
+            <a:ext cx="1093635" cy="346760"/>
+          </a:xfrm>
+          <a:prstGeom prst="rect">
+            <a:avLst/>
+          </a:prstGeom>
+          <a:solidFill>
+            <a:srgbClr val="00B050"/>
+          </a:solidFill>
+          <a:ln w="19050">
+            <a:solidFill>
+              <a:srgbClr val="00B050"/>
+            </a:solidFill>
+          </a:ln>
+          <a:effectLst/>
+        </p:spPr>
+        <p:style>
+          <a:lnRef idx="1">
+            <a:schemeClr val="accent2"/>
+          </a:lnRef>
+          <a:fillRef idx="2">
+            <a:schemeClr val="accent2"/>
+          </a:fillRef>
+          <a:effectRef idx="1">
+            <a:schemeClr val="accent2"/>
+          </a:effectRef>
+          <a:fontRef idx="minor">
+            <a:schemeClr val="dk1"/>
+          </a:fontRef>
+        </p:style>
+        <p:txBody>
           <a:bodyPr rtlCol="0" anchor="ctr"/>
           <a:lstStyle/>
           <a:p>
@@ -3595,8 +3662,8 @@
         </p:nvCxnSpPr>
         <p:spPr>
           <a:xfrm>
-            <a:off x="2422261" y="2573471"/>
-            <a:ext cx="0" cy="2236189"/>
+            <a:off x="43921" y="2573471"/>
+            <a:ext cx="0" cy="4208329"/>
           </a:xfrm>
           <a:prstGeom prst="line">
             <a:avLst/>
@@ -3632,8 +3699,8 @@
         </p:nvSpPr>
         <p:spPr>
           <a:xfrm>
-            <a:off x="2350253" y="2924166"/>
-            <a:ext cx="152400" cy="1733094"/>
+            <a:off x="-28087" y="2924165"/>
+            <a:ext cx="152400" cy="3705231"/>
           </a:xfrm>
           <a:prstGeom prst="rect">
             <a:avLst/>
@@ -3683,7 +3750,7 @@
         </p:nvGrpSpPr>
         <p:grpSpPr>
           <a:xfrm>
-            <a:off x="910815" y="2146326"/>
+            <a:off x="-1467525" y="2146326"/>
             <a:ext cx="324036" cy="573410"/>
             <a:chOff x="3239901" y="4149080"/>
             <a:chExt cx="648072" cy="1146820"/>
@@ -3900,8 +3967,8 @@
         </p:nvSpPr>
         <p:spPr>
           <a:xfrm>
-            <a:off x="3560206" y="2217153"/>
-            <a:ext cx="1093635" cy="346760"/>
+            <a:off x="974460" y="2217153"/>
+            <a:ext cx="1466494" cy="346760"/>
           </a:xfrm>
           <a:prstGeom prst="rect">
             <a:avLst/>
@@ -3941,7 +4008,15 @@
                   <a:schemeClr val="bg1"/>
                 </a:solidFill>
               </a:rPr>
-              <a:t>:Logic</a:t>
+              <a:t>:</a:t>
+            </a:r>
+            <a:r>
+              <a:rPr lang="en-US" sz="1600" dirty="0" err="1">
+                <a:solidFill>
+                  <a:schemeClr val="bg1"/>
+                </a:solidFill>
+              </a:rPr>
+              <a:t>LogicManager</a:t>
             </a:r>
             <a:endParaRPr lang="en-SG" sz="1600" dirty="0">
               <a:solidFill>
@@ -3961,8 +4036,8 @@
         </p:nvCxnSpPr>
         <p:spPr>
           <a:xfrm>
-            <a:off x="4107023" y="2580824"/>
-            <a:ext cx="0" cy="2232502"/>
+            <a:off x="1710692" y="2580824"/>
+            <a:ext cx="0" cy="4200972"/>
           </a:xfrm>
           <a:prstGeom prst="line">
             <a:avLst/>
@@ -3998,8 +4073,8 @@
         </p:nvSpPr>
         <p:spPr>
           <a:xfrm>
-            <a:off x="4035015" y="3039017"/>
-            <a:ext cx="152376" cy="1477495"/>
+            <a:off x="1638684" y="3039017"/>
+            <a:ext cx="152376" cy="3437959"/>
           </a:xfrm>
           <a:prstGeom prst="rect">
             <a:avLst/>
@@ -4049,7 +4124,7 @@
         </p:nvSpPr>
         <p:spPr>
           <a:xfrm>
-            <a:off x="5215412" y="2213466"/>
+            <a:off x="10260165" y="2213466"/>
             <a:ext cx="1093635" cy="346760"/>
           </a:xfrm>
           <a:prstGeom prst="rect">
@@ -4110,8 +4185,8 @@
         </p:nvCxnSpPr>
         <p:spPr>
           <a:xfrm>
-            <a:off x="5762229" y="2577137"/>
-            <a:ext cx="0" cy="2236189"/>
+            <a:off x="10806982" y="2577137"/>
+            <a:ext cx="0" cy="4204659"/>
           </a:xfrm>
           <a:prstGeom prst="line">
             <a:avLst/>
@@ -4147,8 +4222,8 @@
         </p:nvSpPr>
         <p:spPr>
           <a:xfrm>
-            <a:off x="5690221" y="3143948"/>
-            <a:ext cx="101457" cy="369806"/>
+            <a:off x="10726590" y="4114800"/>
+            <a:ext cx="164372" cy="369806"/>
           </a:xfrm>
           <a:prstGeom prst="rect">
             <a:avLst/>
@@ -4200,7 +4275,7 @@
         </p:nvCxnSpPr>
         <p:spPr>
           <a:xfrm flipV="1">
-            <a:off x="1263008" y="2931519"/>
+            <a:off x="-1115332" y="2931519"/>
             <a:ext cx="1095607" cy="1"/>
           </a:xfrm>
           <a:prstGeom prst="straightConnector1">
@@ -4236,7 +4311,7 @@
         </p:nvSpPr>
         <p:spPr>
           <a:xfrm>
-            <a:off x="1345305" y="2989204"/>
+            <a:off x="-1033035" y="2989204"/>
             <a:ext cx="860170" cy="215444"/>
           </a:xfrm>
           <a:prstGeom prst="rect">
@@ -4268,8 +4343,8 @@
         </p:nvCxnSpPr>
         <p:spPr>
           <a:xfrm>
-            <a:off x="2518129" y="3039017"/>
-            <a:ext cx="1516886" cy="1"/>
+            <a:off x="139789" y="3039017"/>
+            <a:ext cx="1498895" cy="0"/>
           </a:xfrm>
           <a:prstGeom prst="straightConnector1">
             <a:avLst/>
@@ -4304,7 +4379,7 @@
         </p:nvSpPr>
         <p:spPr>
           <a:xfrm>
-            <a:off x="2552219" y="3082866"/>
+            <a:off x="173879" y="3082866"/>
             <a:ext cx="1424846" cy="430887"/>
           </a:xfrm>
           <a:prstGeom prst="rect">
@@ -4339,9 +4414,9 @@
           <p:nvPr/>
         </p:nvCxnSpPr>
         <p:spPr>
-          <a:xfrm flipV="1">
-            <a:off x="4179031" y="3143948"/>
-            <a:ext cx="1532384" cy="1"/>
+          <a:xfrm>
+            <a:off x="7433308" y="4114801"/>
+            <a:ext cx="3310892" cy="0"/>
           </a:xfrm>
           <a:prstGeom prst="straightConnector1">
             <a:avLst/>
@@ -4376,7 +4451,7 @@
         </p:nvSpPr>
         <p:spPr>
           <a:xfrm>
-            <a:off x="4371378" y="3150453"/>
+            <a:off x="9296400" y="4121305"/>
             <a:ext cx="1228707" cy="215444"/>
           </a:xfrm>
           <a:prstGeom prst="rect">
@@ -4419,9 +4494,9 @@
           <p:nvPr/>
         </p:nvCxnSpPr>
         <p:spPr>
-          <a:xfrm>
-            <a:off x="4157837" y="3505200"/>
-            <a:ext cx="1532384" cy="0"/>
+          <a:xfrm flipV="1">
+            <a:off x="7433308" y="4485531"/>
+            <a:ext cx="3248499" cy="23640"/>
           </a:xfrm>
           <a:prstGeom prst="straightConnector1">
             <a:avLst/>
@@ -4460,7 +4535,7 @@
         </p:nvCxnSpPr>
         <p:spPr>
           <a:xfrm>
-            <a:off x="2502653" y="4507812"/>
+            <a:off x="124313" y="6477000"/>
             <a:ext cx="1532362" cy="0"/>
           </a:xfrm>
           <a:prstGeom prst="straightConnector1">
@@ -4500,7 +4575,7 @@
         </p:nvCxnSpPr>
         <p:spPr>
           <a:xfrm>
-            <a:off x="1263008" y="4657260"/>
+            <a:off x="-1115332" y="6629400"/>
             <a:ext cx="1087245" cy="0"/>
           </a:xfrm>
           <a:prstGeom prst="straightConnector1">
@@ -4540,8 +4615,8 @@
         </p:nvCxnSpPr>
         <p:spPr>
           <a:xfrm>
-            <a:off x="1072833" y="2712598"/>
-            <a:ext cx="0" cy="2100728"/>
+            <a:off x="-1305507" y="2712598"/>
+            <a:ext cx="0" cy="4069202"/>
           </a:xfrm>
           <a:prstGeom prst="line">
             <a:avLst/>
@@ -4569,12 +4644,105 @@
           </a:fontRef>
         </p:style>
       </p:cxnSp>
-      <p:sp>
-        <p:nvSpPr>
-          <p:cNvPr id="27" name="Rectangle 26">
+      <p:cxnSp>
+        <p:nvCxnSpPr>
+          <p:cNvPr id="30" name="Curved Connector 12">
             <a:extLst>
               <a:ext uri="{FF2B5EF4-FFF2-40B4-BE49-F238E27FC236}">
-                <a16:creationId xmlns:a16="http://schemas.microsoft.com/office/drawing/2014/main" id="{2425EC23-F0D0-4B8E-8A16-4EFB6BA843B7}"/>
+                <a16:creationId xmlns:a16="http://schemas.microsoft.com/office/drawing/2014/main" id="{B3F8C2BB-1F84-4A72-9799-265A2D1B92E0}"/>
+              </a:ext>
+            </a:extLst>
+          </p:cNvPr>
+          <p:cNvCxnSpPr/>
+          <p:nvPr/>
+        </p:nvCxnSpPr>
+        <p:spPr>
+          <a:xfrm rot="16200000" flipH="1">
+            <a:off x="7393557" y="5311978"/>
+            <a:ext cx="156923" cy="76200"/>
+          </a:xfrm>
+          <a:prstGeom prst="curvedConnector4">
+            <a:avLst>
+              <a:gd name="adj1" fmla="val -145677"/>
+              <a:gd name="adj2" fmla="val 400000"/>
+            </a:avLst>
+          </a:prstGeom>
+          <a:ln>
+            <a:solidFill>
+              <a:srgbClr val="0070C0"/>
+            </a:solidFill>
+            <a:tailEnd type="triangle"/>
+          </a:ln>
+        </p:spPr>
+        <p:style>
+          <a:lnRef idx="1">
+            <a:schemeClr val="accent1"/>
+          </a:lnRef>
+          <a:fillRef idx="0">
+            <a:schemeClr val="accent1"/>
+          </a:fillRef>
+          <a:effectRef idx="0">
+            <a:schemeClr val="accent1"/>
+          </a:effectRef>
+          <a:fontRef idx="minor">
+            <a:schemeClr val="tx1"/>
+          </a:fontRef>
+        </p:style>
+      </p:cxnSp>
+      <p:sp>
+        <p:nvSpPr>
+          <p:cNvPr id="31" name="TextBox 30">
+            <a:extLst>
+              <a:ext uri="{FF2B5EF4-FFF2-40B4-BE49-F238E27FC236}">
+                <a16:creationId xmlns:a16="http://schemas.microsoft.com/office/drawing/2014/main" id="{731D5CD2-49EC-4606-9E3E-3230A2D98728}"/>
+              </a:ext>
+            </a:extLst>
+          </p:cNvPr>
+          <p:cNvSpPr txBox="1"/>
+          <p:nvPr/>
+        </p:nvSpPr>
+        <p:spPr>
+          <a:xfrm>
+            <a:off x="7519794" y="4783215"/>
+            <a:ext cx="1038817" cy="430887"/>
+          </a:xfrm>
+          <a:prstGeom prst="rect">
+            <a:avLst/>
+          </a:prstGeom>
+          <a:noFill/>
+        </p:spPr>
+        <p:txBody>
+          <a:bodyPr wrap="square" lIns="0" tIns="0" rIns="0" bIns="0" rtlCol="0">
+            <a:spAutoFit/>
+          </a:bodyPr>
+          <a:lstStyle/>
+          <a:p>
+            <a:pPr algn="ctr"/>
+            <a:r>
+              <a:rPr lang="en-US" sz="1400" dirty="0" err="1">
+                <a:solidFill>
+                  <a:srgbClr val="0070C0"/>
+                </a:solidFill>
+              </a:rPr>
+              <a:t>displayMonthView</a:t>
+            </a:r>
+            <a:r>
+              <a:rPr lang="en-US" sz="1400" dirty="0">
+                <a:solidFill>
+                  <a:srgbClr val="0070C0"/>
+                </a:solidFill>
+              </a:rPr>
+              <a:t>()</a:t>
+            </a:r>
+          </a:p>
+        </p:txBody>
+      </p:sp>
+      <p:sp>
+        <p:nvSpPr>
+          <p:cNvPr id="33" name="Rectangle 62">
+            <a:extLst>
+              <a:ext uri="{FF2B5EF4-FFF2-40B4-BE49-F238E27FC236}">
+                <a16:creationId xmlns:a16="http://schemas.microsoft.com/office/drawing/2014/main" id="{2AF3AC5E-EBC2-47EB-911C-378124232EB8}"/>
               </a:ext>
             </a:extLst>
           </p:cNvPr>
@@ -4583,8 +4751,126 @@
         </p:nvSpPr>
         <p:spPr>
           <a:xfrm>
-            <a:off x="4111466" y="4014790"/>
-            <a:ext cx="152376" cy="237583"/>
+            <a:off x="2590800" y="2209800"/>
+            <a:ext cx="1532381" cy="346760"/>
+          </a:xfrm>
+          <a:prstGeom prst="rect">
+            <a:avLst/>
+          </a:prstGeom>
+          <a:solidFill>
+            <a:srgbClr val="0070C0"/>
+          </a:solidFill>
+          <a:ln w="19050">
+            <a:solidFill>
+              <a:srgbClr val="0070C0"/>
+            </a:solidFill>
+          </a:ln>
+          <a:effectLst/>
+        </p:spPr>
+        <p:style>
+          <a:lnRef idx="1">
+            <a:schemeClr val="accent2"/>
+          </a:lnRef>
+          <a:fillRef idx="2">
+            <a:schemeClr val="accent2"/>
+          </a:fillRef>
+          <a:effectRef idx="1">
+            <a:schemeClr val="accent2"/>
+          </a:effectRef>
+          <a:fontRef idx="minor">
+            <a:schemeClr val="dk1"/>
+          </a:fontRef>
+        </p:style>
+        <p:txBody>
+          <a:bodyPr rtlCol="0" anchor="ctr"/>
+          <a:lstStyle/>
+          <a:p>
+            <a:pPr algn="ctr"/>
+            <a:r>
+              <a:rPr lang="en-US" sz="1600" dirty="0">
+                <a:solidFill>
+                  <a:schemeClr val="bg1"/>
+                </a:solidFill>
+              </a:rPr>
+              <a:t>:</a:t>
+            </a:r>
+            <a:r>
+              <a:rPr lang="en-US" sz="1600" dirty="0" err="1">
+                <a:solidFill>
+                  <a:schemeClr val="bg1"/>
+                </a:solidFill>
+              </a:rPr>
+              <a:t>ParserManager</a:t>
+            </a:r>
+            <a:endParaRPr lang="en-SG" sz="1600" dirty="0">
+              <a:solidFill>
+                <a:schemeClr val="bg1"/>
+              </a:solidFill>
+            </a:endParaRPr>
+          </a:p>
+        </p:txBody>
+      </p:sp>
+      <p:cxnSp>
+        <p:nvCxnSpPr>
+          <p:cNvPr id="36" name="Straight Connector 35">
+            <a:extLst>
+              <a:ext uri="{FF2B5EF4-FFF2-40B4-BE49-F238E27FC236}">
+                <a16:creationId xmlns:a16="http://schemas.microsoft.com/office/drawing/2014/main" id="{56CADBF3-DBE8-4A4E-81F9-3A3D301AAAAF}"/>
+              </a:ext>
+            </a:extLst>
+          </p:cNvPr>
+          <p:cNvCxnSpPr>
+            <a:cxnSpLocks/>
+          </p:cNvCxnSpPr>
+          <p:nvPr/>
+        </p:nvCxnSpPr>
+        <p:spPr>
+          <a:xfrm>
+            <a:off x="3327033" y="2573471"/>
+            <a:ext cx="0" cy="1547834"/>
+          </a:xfrm>
+          <a:prstGeom prst="line">
+            <a:avLst/>
+          </a:prstGeom>
+          <a:ln w="19050">
+            <a:solidFill>
+              <a:srgbClr val="0070C0"/>
+            </a:solidFill>
+            <a:prstDash val="sysDash"/>
+          </a:ln>
+          <a:effectLst/>
+        </p:spPr>
+        <p:style>
+          <a:lnRef idx="1">
+            <a:schemeClr val="accent1"/>
+          </a:lnRef>
+          <a:fillRef idx="2">
+            <a:schemeClr val="accent1"/>
+          </a:fillRef>
+          <a:effectRef idx="1">
+            <a:schemeClr val="accent1"/>
+          </a:effectRef>
+          <a:fontRef idx="minor">
+            <a:schemeClr val="dk1"/>
+          </a:fontRef>
+        </p:style>
+      </p:cxnSp>
+      <p:sp>
+        <p:nvSpPr>
+          <p:cNvPr id="38" name="Rectangle 37">
+            <a:extLst>
+              <a:ext uri="{FF2B5EF4-FFF2-40B4-BE49-F238E27FC236}">
+                <a16:creationId xmlns:a16="http://schemas.microsoft.com/office/drawing/2014/main" id="{A2BC4AF4-8740-4C04-B1E8-1C744377CE79}"/>
+              </a:ext>
+            </a:extLst>
+          </p:cNvPr>
+          <p:cNvSpPr/>
+          <p:nvPr/>
+        </p:nvSpPr>
+        <p:spPr>
+          <a:xfrm>
+            <a:off x="3255025" y="3124200"/>
+            <a:ext cx="152376" cy="697284"/>
           </a:xfrm>
           <a:prstGeom prst="rect">
             <a:avLst/>
@@ -4594,7 +4880,7 @@
           </a:solidFill>
           <a:ln>
             <a:solidFill>
-              <a:schemeClr val="tx1"/>
+              <a:srgbClr val="0070C0"/>
             </a:solidFill>
           </a:ln>
           <a:effectLst/>
@@ -4626,34 +4912,375 @@
           </a:p>
         </p:txBody>
       </p:sp>
-      <p:cxnSp>
-        <p:nvCxnSpPr>
-          <p:cNvPr id="30" name="Curved Connector 12">
+      <p:sp>
+        <p:nvSpPr>
+          <p:cNvPr id="39" name="Rectangle 62">
             <a:extLst>
               <a:ext uri="{FF2B5EF4-FFF2-40B4-BE49-F238E27FC236}">
-                <a16:creationId xmlns:a16="http://schemas.microsoft.com/office/drawing/2014/main" id="{B3F8C2BB-1F84-4A72-9799-265A2D1B92E0}"/>
+                <a16:creationId xmlns:a16="http://schemas.microsoft.com/office/drawing/2014/main" id="{ADEADF77-4167-499F-AFE1-F02AA026CF98}"/>
               </a:ext>
             </a:extLst>
           </p:cNvPr>
-          <p:cNvCxnSpPr/>
+          <p:cNvSpPr/>
+          <p:nvPr/>
+        </p:nvSpPr>
+        <p:spPr>
+          <a:xfrm>
+            <a:off x="4267200" y="2209800"/>
+            <a:ext cx="2057398" cy="346760"/>
+          </a:xfrm>
+          <a:prstGeom prst="rect">
+            <a:avLst/>
+          </a:prstGeom>
+          <a:solidFill>
+            <a:srgbClr val="0070C0"/>
+          </a:solidFill>
+          <a:ln w="19050">
+            <a:solidFill>
+              <a:srgbClr val="0070C0"/>
+            </a:solidFill>
+          </a:ln>
+          <a:effectLst/>
+        </p:spPr>
+        <p:style>
+          <a:lnRef idx="1">
+            <a:schemeClr val="accent2"/>
+          </a:lnRef>
+          <a:fillRef idx="2">
+            <a:schemeClr val="accent2"/>
+          </a:fillRef>
+          <a:effectRef idx="1">
+            <a:schemeClr val="accent2"/>
+          </a:effectRef>
+          <a:fontRef idx="minor">
+            <a:schemeClr val="dk1"/>
+          </a:fontRef>
+        </p:style>
+        <p:txBody>
+          <a:bodyPr rtlCol="0" anchor="ctr"/>
+          <a:lstStyle/>
+          <a:p>
+            <a:pPr algn="ctr"/>
+            <a:r>
+              <a:rPr lang="en-US" sz="1600" dirty="0">
+                <a:solidFill>
+                  <a:schemeClr val="bg1"/>
+                </a:solidFill>
+              </a:rPr>
+              <a:t>:</a:t>
+            </a:r>
+            <a:r>
+              <a:rPr lang="en-US" sz="1600" dirty="0" err="1">
+                <a:solidFill>
+                  <a:schemeClr val="bg1"/>
+                </a:solidFill>
+              </a:rPr>
+              <a:t>ViewCommandParser</a:t>
+            </a:r>
+            <a:endParaRPr lang="en-SG" sz="1600" dirty="0">
+              <a:solidFill>
+                <a:schemeClr val="bg1"/>
+              </a:solidFill>
+            </a:endParaRPr>
+          </a:p>
+        </p:txBody>
+      </p:sp>
+      <p:cxnSp>
+        <p:nvCxnSpPr>
+          <p:cNvPr id="40" name="Straight Connector 39">
+            <a:extLst>
+              <a:ext uri="{FF2B5EF4-FFF2-40B4-BE49-F238E27FC236}">
+                <a16:creationId xmlns:a16="http://schemas.microsoft.com/office/drawing/2014/main" id="{AE985DCC-83C0-4117-8C1D-234D1EC33945}"/>
+              </a:ext>
+            </a:extLst>
+          </p:cNvPr>
+          <p:cNvCxnSpPr>
+            <a:cxnSpLocks/>
+          </p:cNvCxnSpPr>
           <p:nvPr/>
         </p:nvCxnSpPr>
         <p:spPr>
-          <a:xfrm rot="16200000" flipH="1">
-            <a:off x="4189823" y="4038987"/>
-            <a:ext cx="156923" cy="76200"/>
-          </a:xfrm>
-          <a:prstGeom prst="curvedConnector4">
-            <a:avLst>
-              <a:gd name="adj1" fmla="val -145677"/>
-              <a:gd name="adj2" fmla="val 400000"/>
-            </a:avLst>
+          <a:xfrm>
+            <a:off x="5253608" y="2573471"/>
+            <a:ext cx="0" cy="1541329"/>
+          </a:xfrm>
+          <a:prstGeom prst="line">
+            <a:avLst/>
           </a:prstGeom>
+          <a:ln w="19050">
+            <a:solidFill>
+              <a:srgbClr val="0070C0"/>
+            </a:solidFill>
+            <a:prstDash val="sysDash"/>
+          </a:ln>
+          <a:effectLst/>
+        </p:spPr>
+        <p:style>
+          <a:lnRef idx="1">
+            <a:schemeClr val="accent1"/>
+          </a:lnRef>
+          <a:fillRef idx="2">
+            <a:schemeClr val="accent1"/>
+          </a:fillRef>
+          <a:effectRef idx="1">
+            <a:schemeClr val="accent1"/>
+          </a:effectRef>
+          <a:fontRef idx="minor">
+            <a:schemeClr val="dk1"/>
+          </a:fontRef>
+        </p:style>
+      </p:cxnSp>
+      <p:sp>
+        <p:nvSpPr>
+          <p:cNvPr id="41" name="Rectangle 40">
+            <a:extLst>
+              <a:ext uri="{FF2B5EF4-FFF2-40B4-BE49-F238E27FC236}">
+                <a16:creationId xmlns:a16="http://schemas.microsoft.com/office/drawing/2014/main" id="{3628E37B-4C1C-4E71-8E59-D89752ED3B43}"/>
+              </a:ext>
+            </a:extLst>
+          </p:cNvPr>
+          <p:cNvSpPr/>
+          <p:nvPr/>
+        </p:nvSpPr>
+        <p:spPr>
+          <a:xfrm>
+            <a:off x="5181600" y="3200401"/>
+            <a:ext cx="152376" cy="533387"/>
+          </a:xfrm>
+          <a:prstGeom prst="rect">
+            <a:avLst/>
+          </a:prstGeom>
+          <a:solidFill>
+            <a:srgbClr val="0070C0"/>
+          </a:solidFill>
           <a:ln>
             <a:solidFill>
               <a:srgbClr val="0070C0"/>
             </a:solidFill>
-            <a:tailEnd type="triangle"/>
+          </a:ln>
+          <a:effectLst/>
+        </p:spPr>
+        <p:style>
+          <a:lnRef idx="1">
+            <a:schemeClr val="accent3"/>
+          </a:lnRef>
+          <a:fillRef idx="2">
+            <a:schemeClr val="accent3"/>
+          </a:fillRef>
+          <a:effectRef idx="1">
+            <a:schemeClr val="accent3"/>
+          </a:effectRef>
+          <a:fontRef idx="minor">
+            <a:schemeClr val="dk1"/>
+          </a:fontRef>
+        </p:style>
+        <p:txBody>
+          <a:bodyPr rtlCol="0" anchor="ctr"/>
+          <a:lstStyle/>
+          <a:p>
+            <a:pPr algn="ctr"/>
+            <a:endParaRPr lang="en-SG" sz="1400">
+              <a:solidFill>
+                <a:schemeClr val="dk1"/>
+              </a:solidFill>
+            </a:endParaRPr>
+          </a:p>
+        </p:txBody>
+      </p:sp>
+      <p:sp>
+        <p:nvSpPr>
+          <p:cNvPr id="42" name="Rectangle 62">
+            <a:extLst>
+              <a:ext uri="{FF2B5EF4-FFF2-40B4-BE49-F238E27FC236}">
+                <a16:creationId xmlns:a16="http://schemas.microsoft.com/office/drawing/2014/main" id="{4F222053-D3DE-489C-BAD7-BB4F7C701CA7}"/>
+              </a:ext>
+            </a:extLst>
+          </p:cNvPr>
+          <p:cNvSpPr/>
+          <p:nvPr/>
+        </p:nvSpPr>
+        <p:spPr>
+          <a:xfrm>
+            <a:off x="6476999" y="2209800"/>
+            <a:ext cx="1600199" cy="346760"/>
+          </a:xfrm>
+          <a:prstGeom prst="rect">
+            <a:avLst/>
+          </a:prstGeom>
+          <a:solidFill>
+            <a:srgbClr val="0070C0"/>
+          </a:solidFill>
+          <a:ln w="19050">
+            <a:solidFill>
+              <a:srgbClr val="0070C0"/>
+            </a:solidFill>
+          </a:ln>
+          <a:effectLst/>
+        </p:spPr>
+        <p:style>
+          <a:lnRef idx="1">
+            <a:schemeClr val="accent2"/>
+          </a:lnRef>
+          <a:fillRef idx="2">
+            <a:schemeClr val="accent2"/>
+          </a:fillRef>
+          <a:effectRef idx="1">
+            <a:schemeClr val="accent2"/>
+          </a:effectRef>
+          <a:fontRef idx="minor">
+            <a:schemeClr val="dk1"/>
+          </a:fontRef>
+        </p:style>
+        <p:txBody>
+          <a:bodyPr rtlCol="0" anchor="ctr"/>
+          <a:lstStyle/>
+          <a:p>
+            <a:pPr algn="ctr"/>
+            <a:r>
+              <a:rPr lang="en-US" sz="1600" dirty="0">
+                <a:solidFill>
+                  <a:schemeClr val="bg1"/>
+                </a:solidFill>
+              </a:rPr>
+              <a:t>v:ViewCommand</a:t>
+            </a:r>
+            <a:endParaRPr lang="en-SG" sz="1600" dirty="0">
+              <a:solidFill>
+                <a:schemeClr val="bg1"/>
+              </a:solidFill>
+            </a:endParaRPr>
+          </a:p>
+        </p:txBody>
+      </p:sp>
+      <p:cxnSp>
+        <p:nvCxnSpPr>
+          <p:cNvPr id="43" name="Straight Connector 42">
+            <a:extLst>
+              <a:ext uri="{FF2B5EF4-FFF2-40B4-BE49-F238E27FC236}">
+                <a16:creationId xmlns:a16="http://schemas.microsoft.com/office/drawing/2014/main" id="{8B53E5BA-2C17-4451-A025-E008E1CE4695}"/>
+              </a:ext>
+            </a:extLst>
+          </p:cNvPr>
+          <p:cNvCxnSpPr>
+            <a:cxnSpLocks/>
+          </p:cNvCxnSpPr>
+          <p:nvPr/>
+        </p:nvCxnSpPr>
+        <p:spPr>
+          <a:xfrm>
+            <a:off x="7311032" y="2573471"/>
+            <a:ext cx="0" cy="3827329"/>
+          </a:xfrm>
+          <a:prstGeom prst="line">
+            <a:avLst/>
+          </a:prstGeom>
+          <a:ln w="19050">
+            <a:solidFill>
+              <a:srgbClr val="0070C0"/>
+            </a:solidFill>
+            <a:prstDash val="sysDash"/>
+          </a:ln>
+          <a:effectLst/>
+        </p:spPr>
+        <p:style>
+          <a:lnRef idx="1">
+            <a:schemeClr val="accent1"/>
+          </a:lnRef>
+          <a:fillRef idx="2">
+            <a:schemeClr val="accent1"/>
+          </a:fillRef>
+          <a:effectRef idx="1">
+            <a:schemeClr val="accent1"/>
+          </a:effectRef>
+          <a:fontRef idx="minor">
+            <a:schemeClr val="dk1"/>
+          </a:fontRef>
+        </p:style>
+      </p:cxnSp>
+      <p:sp>
+        <p:nvSpPr>
+          <p:cNvPr id="44" name="Rectangle 43">
+            <a:extLst>
+              <a:ext uri="{FF2B5EF4-FFF2-40B4-BE49-F238E27FC236}">
+                <a16:creationId xmlns:a16="http://schemas.microsoft.com/office/drawing/2014/main" id="{77EF9C85-7700-4CC8-BAC2-D32DA9BB5D38}"/>
+              </a:ext>
+            </a:extLst>
+          </p:cNvPr>
+          <p:cNvSpPr/>
+          <p:nvPr/>
+        </p:nvSpPr>
+        <p:spPr>
+          <a:xfrm>
+            <a:off x="7239024" y="3276601"/>
+            <a:ext cx="152376" cy="380993"/>
+          </a:xfrm>
+          <a:prstGeom prst="rect">
+            <a:avLst/>
+          </a:prstGeom>
+          <a:solidFill>
+            <a:srgbClr val="0070C0"/>
+          </a:solidFill>
+          <a:ln>
+            <a:solidFill>
+              <a:srgbClr val="0070C0"/>
+            </a:solidFill>
+          </a:ln>
+          <a:effectLst/>
+        </p:spPr>
+        <p:style>
+          <a:lnRef idx="1">
+            <a:schemeClr val="accent3"/>
+          </a:lnRef>
+          <a:fillRef idx="2">
+            <a:schemeClr val="accent3"/>
+          </a:fillRef>
+          <a:effectRef idx="1">
+            <a:schemeClr val="accent3"/>
+          </a:effectRef>
+          <a:fontRef idx="minor">
+            <a:schemeClr val="dk1"/>
+          </a:fontRef>
+        </p:style>
+        <p:txBody>
+          <a:bodyPr rtlCol="0" anchor="ctr"/>
+          <a:lstStyle/>
+          <a:p>
+            <a:pPr algn="ctr"/>
+            <a:endParaRPr lang="en-SG" sz="1400">
+              <a:solidFill>
+                <a:schemeClr val="dk1"/>
+              </a:solidFill>
+            </a:endParaRPr>
+          </a:p>
+        </p:txBody>
+      </p:sp>
+      <p:cxnSp>
+        <p:nvCxnSpPr>
+          <p:cNvPr id="45" name="Straight Arrow Connector 44">
+            <a:extLst>
+              <a:ext uri="{FF2B5EF4-FFF2-40B4-BE49-F238E27FC236}">
+                <a16:creationId xmlns:a16="http://schemas.microsoft.com/office/drawing/2014/main" id="{1CEC698D-DEC0-4F4F-8848-88DB11A89339}"/>
+              </a:ext>
+            </a:extLst>
+          </p:cNvPr>
+          <p:cNvCxnSpPr>
+            <a:cxnSpLocks/>
+          </p:cNvCxnSpPr>
+          <p:nvPr/>
+        </p:nvCxnSpPr>
+        <p:spPr>
+          <a:xfrm flipV="1">
+            <a:off x="1810106" y="3124201"/>
+            <a:ext cx="1444919" cy="1"/>
+          </a:xfrm>
+          <a:prstGeom prst="straightConnector1">
+            <a:avLst/>
+          </a:prstGeom>
+          <a:ln w="19050">
+            <a:solidFill>
+              <a:srgbClr val="0070C0"/>
+            </a:solidFill>
+            <a:tailEnd type="arrow"/>
           </a:ln>
         </p:spPr>
         <p:style>
@@ -4673,10 +5300,10 @@
       </p:cxnSp>
       <p:sp>
         <p:nvSpPr>
-          <p:cNvPr id="31" name="TextBox 30">
+          <p:cNvPr id="46" name="TextBox 45">
             <a:extLst>
               <a:ext uri="{FF2B5EF4-FFF2-40B4-BE49-F238E27FC236}">
-                <a16:creationId xmlns:a16="http://schemas.microsoft.com/office/drawing/2014/main" id="{731D5CD2-49EC-4606-9E3E-3230A2D98728}"/>
+                <a16:creationId xmlns:a16="http://schemas.microsoft.com/office/drawing/2014/main" id="{486C88FE-CC3F-44A4-A382-45942E7398E0}"/>
               </a:ext>
             </a:extLst>
           </p:cNvPr>
@@ -4685,8 +5312,8 @@
         </p:nvSpPr>
         <p:spPr>
           <a:xfrm>
-            <a:off x="4599983" y="3821486"/>
-            <a:ext cx="1038817" cy="430887"/>
+            <a:off x="1905000" y="3146060"/>
+            <a:ext cx="1186620" cy="430887"/>
           </a:xfrm>
           <a:prstGeom prst="rect">
             <a:avLst/>
@@ -4706,7 +5333,823 @@
                   <a:srgbClr val="0070C0"/>
                 </a:solidFill>
               </a:rPr>
-              <a:t>displayMonthView</a:t>
+              <a:t>parseCommand</a:t>
+            </a:r>
+            <a:r>
+              <a:rPr lang="en-US" sz="1400" dirty="0">
+                <a:solidFill>
+                  <a:srgbClr val="0070C0"/>
+                </a:solidFill>
+              </a:rPr>
+              <a:t>(“view month”)</a:t>
+            </a:r>
+          </a:p>
+        </p:txBody>
+      </p:sp>
+      <p:cxnSp>
+        <p:nvCxnSpPr>
+          <p:cNvPr id="47" name="Straight Arrow Connector 46">
+            <a:extLst>
+              <a:ext uri="{FF2B5EF4-FFF2-40B4-BE49-F238E27FC236}">
+                <a16:creationId xmlns:a16="http://schemas.microsoft.com/office/drawing/2014/main" id="{5D731D3E-B387-4F56-A285-D44238C6B1A8}"/>
+              </a:ext>
+            </a:extLst>
+          </p:cNvPr>
+          <p:cNvCxnSpPr>
+            <a:cxnSpLocks/>
+          </p:cNvCxnSpPr>
+          <p:nvPr/>
+        </p:nvCxnSpPr>
+        <p:spPr>
+          <a:xfrm flipV="1">
+            <a:off x="3429000" y="3200401"/>
+            <a:ext cx="1752600" cy="1"/>
+          </a:xfrm>
+          <a:prstGeom prst="straightConnector1">
+            <a:avLst/>
+          </a:prstGeom>
+          <a:ln w="19050">
+            <a:solidFill>
+              <a:srgbClr val="0070C0"/>
+            </a:solidFill>
+            <a:tailEnd type="arrow"/>
+          </a:ln>
+        </p:spPr>
+        <p:style>
+          <a:lnRef idx="1">
+            <a:schemeClr val="accent1"/>
+          </a:lnRef>
+          <a:fillRef idx="0">
+            <a:schemeClr val="accent1"/>
+          </a:fillRef>
+          <a:effectRef idx="0">
+            <a:schemeClr val="accent1"/>
+          </a:effectRef>
+          <a:fontRef idx="minor">
+            <a:schemeClr val="tx1"/>
+          </a:fontRef>
+        </p:style>
+      </p:cxnSp>
+      <p:sp>
+        <p:nvSpPr>
+          <p:cNvPr id="48" name="TextBox 47">
+            <a:extLst>
+              <a:ext uri="{FF2B5EF4-FFF2-40B4-BE49-F238E27FC236}">
+                <a16:creationId xmlns:a16="http://schemas.microsoft.com/office/drawing/2014/main" id="{E3A83390-26BC-4EC9-983B-5E54003CCBE7}"/>
+              </a:ext>
+            </a:extLst>
+          </p:cNvPr>
+          <p:cNvSpPr txBox="1"/>
+          <p:nvPr/>
+        </p:nvSpPr>
+        <p:spPr>
+          <a:xfrm>
+            <a:off x="3733800" y="3222260"/>
+            <a:ext cx="1186620" cy="215444"/>
+          </a:xfrm>
+          <a:prstGeom prst="rect">
+            <a:avLst/>
+          </a:prstGeom>
+          <a:noFill/>
+        </p:spPr>
+        <p:txBody>
+          <a:bodyPr wrap="square" lIns="0" tIns="0" rIns="0" bIns="0" rtlCol="0">
+            <a:spAutoFit/>
+          </a:bodyPr>
+          <a:lstStyle/>
+          <a:p>
+            <a:pPr algn="ctr"/>
+            <a:r>
+              <a:rPr lang="en-US" sz="1400" dirty="0">
+                <a:solidFill>
+                  <a:srgbClr val="0070C0"/>
+                </a:solidFill>
+              </a:rPr>
+              <a:t>parse(“month”)</a:t>
+            </a:r>
+          </a:p>
+        </p:txBody>
+      </p:sp>
+      <p:cxnSp>
+        <p:nvCxnSpPr>
+          <p:cNvPr id="49" name="Straight Arrow Connector 48">
+            <a:extLst>
+              <a:ext uri="{FF2B5EF4-FFF2-40B4-BE49-F238E27FC236}">
+                <a16:creationId xmlns:a16="http://schemas.microsoft.com/office/drawing/2014/main" id="{B33592F5-5113-487F-A7EB-17AEA4D4528B}"/>
+              </a:ext>
+            </a:extLst>
+          </p:cNvPr>
+          <p:cNvCxnSpPr>
+            <a:cxnSpLocks/>
+          </p:cNvCxnSpPr>
+          <p:nvPr/>
+        </p:nvCxnSpPr>
+        <p:spPr>
+          <a:xfrm flipV="1">
+            <a:off x="5334000" y="3276601"/>
+            <a:ext cx="1905000" cy="1"/>
+          </a:xfrm>
+          <a:prstGeom prst="straightConnector1">
+            <a:avLst/>
+          </a:prstGeom>
+          <a:ln w="19050">
+            <a:solidFill>
+              <a:srgbClr val="0070C0"/>
+            </a:solidFill>
+            <a:tailEnd type="arrow"/>
+          </a:ln>
+        </p:spPr>
+        <p:style>
+          <a:lnRef idx="1">
+            <a:schemeClr val="accent1"/>
+          </a:lnRef>
+          <a:fillRef idx="0">
+            <a:schemeClr val="accent1"/>
+          </a:fillRef>
+          <a:effectRef idx="0">
+            <a:schemeClr val="accent1"/>
+          </a:effectRef>
+          <a:fontRef idx="minor">
+            <a:schemeClr val="tx1"/>
+          </a:fontRef>
+        </p:style>
+      </p:cxnSp>
+      <p:sp>
+        <p:nvSpPr>
+          <p:cNvPr id="50" name="TextBox 49">
+            <a:extLst>
+              <a:ext uri="{FF2B5EF4-FFF2-40B4-BE49-F238E27FC236}">
+                <a16:creationId xmlns:a16="http://schemas.microsoft.com/office/drawing/2014/main" id="{55B10691-3FCB-4741-BAB4-135E8D94B569}"/>
+              </a:ext>
+            </a:extLst>
+          </p:cNvPr>
+          <p:cNvSpPr txBox="1"/>
+          <p:nvPr/>
+        </p:nvSpPr>
+        <p:spPr>
+          <a:xfrm>
+            <a:off x="5355103" y="3332361"/>
+            <a:ext cx="1875562" cy="215444"/>
+          </a:xfrm>
+          <a:prstGeom prst="rect">
+            <a:avLst/>
+          </a:prstGeom>
+          <a:noFill/>
+        </p:spPr>
+        <p:txBody>
+          <a:bodyPr wrap="square" lIns="0" tIns="0" rIns="0" bIns="0" rtlCol="0">
+            <a:spAutoFit/>
+          </a:bodyPr>
+          <a:lstStyle/>
+          <a:p>
+            <a:pPr algn="ctr"/>
+            <a:r>
+              <a:rPr lang="en-US" sz="1400" dirty="0" err="1">
+                <a:solidFill>
+                  <a:srgbClr val="0070C0"/>
+                </a:solidFill>
+              </a:rPr>
+              <a:t>ViewCommand</a:t>
+            </a:r>
+            <a:r>
+              <a:rPr lang="en-US" sz="1400" dirty="0">
+                <a:solidFill>
+                  <a:srgbClr val="0070C0"/>
+                </a:solidFill>
+              </a:rPr>
+              <a:t>(“month”)</a:t>
+            </a:r>
+          </a:p>
+        </p:txBody>
+      </p:sp>
+      <p:cxnSp>
+        <p:nvCxnSpPr>
+          <p:cNvPr id="51" name="Straight Arrow Connector 50">
+            <a:extLst>
+              <a:ext uri="{FF2B5EF4-FFF2-40B4-BE49-F238E27FC236}">
+                <a16:creationId xmlns:a16="http://schemas.microsoft.com/office/drawing/2014/main" id="{8266E446-317E-4D73-8388-DDB9ED82C30E}"/>
+              </a:ext>
+            </a:extLst>
+          </p:cNvPr>
+          <p:cNvCxnSpPr>
+            <a:cxnSpLocks/>
+          </p:cNvCxnSpPr>
+          <p:nvPr/>
+        </p:nvCxnSpPr>
+        <p:spPr>
+          <a:xfrm flipH="1">
+            <a:off x="5334000" y="3657600"/>
+            <a:ext cx="1896665" cy="0"/>
+          </a:xfrm>
+          <a:prstGeom prst="straightConnector1">
+            <a:avLst/>
+          </a:prstGeom>
+          <a:ln w="19050">
+            <a:solidFill>
+              <a:srgbClr val="0070C0"/>
+            </a:solidFill>
+            <a:prstDash val="sysDash"/>
+            <a:tailEnd type="arrow"/>
+          </a:ln>
+        </p:spPr>
+        <p:style>
+          <a:lnRef idx="1">
+            <a:schemeClr val="accent1"/>
+          </a:lnRef>
+          <a:fillRef idx="0">
+            <a:schemeClr val="accent1"/>
+          </a:fillRef>
+          <a:effectRef idx="0">
+            <a:schemeClr val="accent1"/>
+          </a:effectRef>
+          <a:fontRef idx="minor">
+            <a:schemeClr val="tx1"/>
+          </a:fontRef>
+        </p:style>
+      </p:cxnSp>
+      <p:cxnSp>
+        <p:nvCxnSpPr>
+          <p:cNvPr id="52" name="Straight Arrow Connector 51">
+            <a:extLst>
+              <a:ext uri="{FF2B5EF4-FFF2-40B4-BE49-F238E27FC236}">
+                <a16:creationId xmlns:a16="http://schemas.microsoft.com/office/drawing/2014/main" id="{C2AFBA44-2C14-45D5-8D8F-89ECD99A2838}"/>
+              </a:ext>
+            </a:extLst>
+          </p:cNvPr>
+          <p:cNvCxnSpPr>
+            <a:cxnSpLocks/>
+          </p:cNvCxnSpPr>
+          <p:nvPr/>
+        </p:nvCxnSpPr>
+        <p:spPr>
+          <a:xfrm rot="10800000" flipV="1">
+            <a:off x="3414021" y="3733787"/>
+            <a:ext cx="1752600" cy="1"/>
+          </a:xfrm>
+          <a:prstGeom prst="straightConnector1">
+            <a:avLst/>
+          </a:prstGeom>
+          <a:ln w="19050">
+            <a:solidFill>
+              <a:srgbClr val="0070C0"/>
+            </a:solidFill>
+            <a:prstDash val="sysDash"/>
+            <a:tailEnd type="arrow"/>
+          </a:ln>
+        </p:spPr>
+        <p:style>
+          <a:lnRef idx="1">
+            <a:schemeClr val="accent1"/>
+          </a:lnRef>
+          <a:fillRef idx="0">
+            <a:schemeClr val="accent1"/>
+          </a:fillRef>
+          <a:effectRef idx="0">
+            <a:schemeClr val="accent1"/>
+          </a:effectRef>
+          <a:fontRef idx="minor">
+            <a:schemeClr val="tx1"/>
+          </a:fontRef>
+        </p:style>
+      </p:cxnSp>
+      <p:cxnSp>
+        <p:nvCxnSpPr>
+          <p:cNvPr id="53" name="Straight Arrow Connector 52">
+            <a:extLst>
+              <a:ext uri="{FF2B5EF4-FFF2-40B4-BE49-F238E27FC236}">
+                <a16:creationId xmlns:a16="http://schemas.microsoft.com/office/drawing/2014/main" id="{D37A435E-1AF7-45BF-B1C2-E67809A65FDA}"/>
+              </a:ext>
+            </a:extLst>
+          </p:cNvPr>
+          <p:cNvCxnSpPr>
+            <a:cxnSpLocks/>
+          </p:cNvCxnSpPr>
+          <p:nvPr/>
+        </p:nvCxnSpPr>
+        <p:spPr>
+          <a:xfrm rot="10800000" flipV="1">
+            <a:off x="1799988" y="3821484"/>
+            <a:ext cx="1444919" cy="1"/>
+          </a:xfrm>
+          <a:prstGeom prst="straightConnector1">
+            <a:avLst/>
+          </a:prstGeom>
+          <a:ln w="19050">
+            <a:solidFill>
+              <a:srgbClr val="0070C0"/>
+            </a:solidFill>
+            <a:prstDash val="sysDash"/>
+            <a:tailEnd type="arrow"/>
+          </a:ln>
+        </p:spPr>
+        <p:style>
+          <a:lnRef idx="1">
+            <a:schemeClr val="accent1"/>
+          </a:lnRef>
+          <a:fillRef idx="0">
+            <a:schemeClr val="accent1"/>
+          </a:fillRef>
+          <a:effectRef idx="0">
+            <a:schemeClr val="accent1"/>
+          </a:effectRef>
+          <a:fontRef idx="minor">
+            <a:schemeClr val="tx1"/>
+          </a:fontRef>
+        </p:style>
+      </p:cxnSp>
+      <p:cxnSp>
+        <p:nvCxnSpPr>
+          <p:cNvPr id="54" name="Straight Arrow Connector 53">
+            <a:extLst>
+              <a:ext uri="{FF2B5EF4-FFF2-40B4-BE49-F238E27FC236}">
+                <a16:creationId xmlns:a16="http://schemas.microsoft.com/office/drawing/2014/main" id="{41AE6401-C9AD-4A16-9092-E1183665B4BD}"/>
+              </a:ext>
+            </a:extLst>
+          </p:cNvPr>
+          <p:cNvCxnSpPr>
+            <a:cxnSpLocks/>
+          </p:cNvCxnSpPr>
+          <p:nvPr/>
+        </p:nvCxnSpPr>
+        <p:spPr>
+          <a:xfrm flipV="1">
+            <a:off x="1828800" y="4038601"/>
+            <a:ext cx="5401865" cy="1"/>
+          </a:xfrm>
+          <a:prstGeom prst="straightConnector1">
+            <a:avLst/>
+          </a:prstGeom>
+          <a:ln w="19050">
+            <a:solidFill>
+              <a:srgbClr val="0070C0"/>
+            </a:solidFill>
+            <a:tailEnd type="arrow"/>
+          </a:ln>
+        </p:spPr>
+        <p:style>
+          <a:lnRef idx="1">
+            <a:schemeClr val="accent1"/>
+          </a:lnRef>
+          <a:fillRef idx="0">
+            <a:schemeClr val="accent1"/>
+          </a:fillRef>
+          <a:effectRef idx="0">
+            <a:schemeClr val="accent1"/>
+          </a:effectRef>
+          <a:fontRef idx="minor">
+            <a:schemeClr val="tx1"/>
+          </a:fontRef>
+        </p:style>
+      </p:cxnSp>
+      <p:sp>
+        <p:nvSpPr>
+          <p:cNvPr id="56" name="Rectangle 55">
+            <a:extLst>
+              <a:ext uri="{FF2B5EF4-FFF2-40B4-BE49-F238E27FC236}">
+                <a16:creationId xmlns:a16="http://schemas.microsoft.com/office/drawing/2014/main" id="{09494BDA-A973-47AE-97EF-0A4C67D2A960}"/>
+              </a:ext>
+            </a:extLst>
+          </p:cNvPr>
+          <p:cNvSpPr/>
+          <p:nvPr/>
+        </p:nvSpPr>
+        <p:spPr>
+          <a:xfrm>
+            <a:off x="7239000" y="4038607"/>
+            <a:ext cx="152376" cy="2285993"/>
+          </a:xfrm>
+          <a:prstGeom prst="rect">
+            <a:avLst/>
+          </a:prstGeom>
+          <a:solidFill>
+            <a:srgbClr val="0070C0"/>
+          </a:solidFill>
+          <a:ln>
+            <a:solidFill>
+              <a:srgbClr val="0070C0"/>
+            </a:solidFill>
+          </a:ln>
+          <a:effectLst/>
+        </p:spPr>
+        <p:style>
+          <a:lnRef idx="1">
+            <a:schemeClr val="accent3"/>
+          </a:lnRef>
+          <a:fillRef idx="2">
+            <a:schemeClr val="accent3"/>
+          </a:fillRef>
+          <a:effectRef idx="1">
+            <a:schemeClr val="accent3"/>
+          </a:effectRef>
+          <a:fontRef idx="minor">
+            <a:schemeClr val="dk1"/>
+          </a:fontRef>
+        </p:style>
+        <p:txBody>
+          <a:bodyPr rtlCol="0" anchor="ctr"/>
+          <a:lstStyle/>
+          <a:p>
+            <a:pPr algn="ctr"/>
+            <a:endParaRPr lang="en-SG" sz="1400">
+              <a:solidFill>
+                <a:schemeClr val="dk1"/>
+              </a:solidFill>
+            </a:endParaRPr>
+          </a:p>
+        </p:txBody>
+      </p:sp>
+      <p:sp>
+        <p:nvSpPr>
+          <p:cNvPr id="58" name="TextBox 57">
+            <a:extLst>
+              <a:ext uri="{FF2B5EF4-FFF2-40B4-BE49-F238E27FC236}">
+                <a16:creationId xmlns:a16="http://schemas.microsoft.com/office/drawing/2014/main" id="{669D3C42-7A50-4C8D-B5B1-ABF22B645206}"/>
+              </a:ext>
+            </a:extLst>
+          </p:cNvPr>
+          <p:cNvSpPr txBox="1"/>
+          <p:nvPr/>
+        </p:nvSpPr>
+        <p:spPr>
+          <a:xfrm>
+            <a:off x="3886200" y="4051756"/>
+            <a:ext cx="1186620" cy="215444"/>
+          </a:xfrm>
+          <a:prstGeom prst="rect">
+            <a:avLst/>
+          </a:prstGeom>
+          <a:noFill/>
+        </p:spPr>
+        <p:txBody>
+          <a:bodyPr wrap="square" lIns="0" tIns="0" rIns="0" bIns="0" rtlCol="0">
+            <a:spAutoFit/>
+          </a:bodyPr>
+          <a:lstStyle/>
+          <a:p>
+            <a:pPr algn="ctr"/>
+            <a:r>
+              <a:rPr lang="en-US" sz="1400" dirty="0">
+                <a:solidFill>
+                  <a:srgbClr val="0070C0"/>
+                </a:solidFill>
+              </a:rPr>
+              <a:t>execute()</a:t>
+            </a:r>
+          </a:p>
+        </p:txBody>
+      </p:sp>
+      <p:sp>
+        <p:nvSpPr>
+          <p:cNvPr id="59" name="TextBox 58">
+            <a:extLst>
+              <a:ext uri="{FF2B5EF4-FFF2-40B4-BE49-F238E27FC236}">
+                <a16:creationId xmlns:a16="http://schemas.microsoft.com/office/drawing/2014/main" id="{150477F2-983D-4178-9ED4-9A8713DC6EBA}"/>
+              </a:ext>
+            </a:extLst>
+          </p:cNvPr>
+          <p:cNvSpPr txBox="1"/>
+          <p:nvPr/>
+        </p:nvSpPr>
+        <p:spPr>
+          <a:xfrm>
+            <a:off x="1974598" y="3609058"/>
+            <a:ext cx="1186620" cy="215444"/>
+          </a:xfrm>
+          <a:prstGeom prst="rect">
+            <a:avLst/>
+          </a:prstGeom>
+          <a:noFill/>
+        </p:spPr>
+        <p:txBody>
+          <a:bodyPr wrap="square" lIns="0" tIns="0" rIns="0" bIns="0" rtlCol="0">
+            <a:spAutoFit/>
+          </a:bodyPr>
+          <a:lstStyle/>
+          <a:p>
+            <a:pPr algn="ctr"/>
+            <a:r>
+              <a:rPr lang="en-US" sz="1400" dirty="0">
+                <a:solidFill>
+                  <a:srgbClr val="0070C0"/>
+                </a:solidFill>
+              </a:rPr>
+              <a:t>v</a:t>
+            </a:r>
+          </a:p>
+        </p:txBody>
+      </p:sp>
+      <p:sp>
+        <p:nvSpPr>
+          <p:cNvPr id="27" name="Rectangle 26">
+            <a:extLst>
+              <a:ext uri="{FF2B5EF4-FFF2-40B4-BE49-F238E27FC236}">
+                <a16:creationId xmlns:a16="http://schemas.microsoft.com/office/drawing/2014/main" id="{2425EC23-F0D0-4B8E-8A16-4EFB6BA843B7}"/>
+              </a:ext>
+            </a:extLst>
+          </p:cNvPr>
+          <p:cNvSpPr/>
+          <p:nvPr/>
+        </p:nvSpPr>
+        <p:spPr>
+          <a:xfrm>
+            <a:off x="7315200" y="5287781"/>
+            <a:ext cx="152376" cy="237583"/>
+          </a:xfrm>
+          <a:prstGeom prst="rect">
+            <a:avLst/>
+          </a:prstGeom>
+          <a:solidFill>
+            <a:srgbClr val="0070C0"/>
+          </a:solidFill>
+          <a:ln>
+            <a:solidFill>
+              <a:schemeClr val="tx1"/>
+            </a:solidFill>
+          </a:ln>
+          <a:effectLst/>
+        </p:spPr>
+        <p:style>
+          <a:lnRef idx="1">
+            <a:schemeClr val="accent3"/>
+          </a:lnRef>
+          <a:fillRef idx="2">
+            <a:schemeClr val="accent3"/>
+          </a:fillRef>
+          <a:effectRef idx="1">
+            <a:schemeClr val="accent3"/>
+          </a:effectRef>
+          <a:fontRef idx="minor">
+            <a:schemeClr val="dk1"/>
+          </a:fontRef>
+        </p:style>
+        <p:txBody>
+          <a:bodyPr rtlCol="0" anchor="ctr"/>
+          <a:lstStyle/>
+          <a:p>
+            <a:pPr algn="ctr"/>
+            <a:endParaRPr lang="en-SG" sz="1400">
+              <a:solidFill>
+                <a:schemeClr val="dk1"/>
+              </a:solidFill>
+            </a:endParaRPr>
+          </a:p>
+        </p:txBody>
+      </p:sp>
+      <p:sp>
+        <p:nvSpPr>
+          <p:cNvPr id="69" name="Rectangle 62">
+            <a:extLst>
+              <a:ext uri="{FF2B5EF4-FFF2-40B4-BE49-F238E27FC236}">
+                <a16:creationId xmlns:a16="http://schemas.microsoft.com/office/drawing/2014/main" id="{1F1FA207-18C3-479A-83BA-82D89D25A7AA}"/>
+              </a:ext>
+            </a:extLst>
+          </p:cNvPr>
+          <p:cNvSpPr/>
+          <p:nvPr/>
+        </p:nvSpPr>
+        <p:spPr>
+          <a:xfrm>
+            <a:off x="8229600" y="2209800"/>
+            <a:ext cx="1600199" cy="346760"/>
+          </a:xfrm>
+          <a:prstGeom prst="rect">
+            <a:avLst/>
+          </a:prstGeom>
+          <a:solidFill>
+            <a:srgbClr val="0070C0"/>
+          </a:solidFill>
+          <a:ln w="19050">
+            <a:solidFill>
+              <a:srgbClr val="0070C0"/>
+            </a:solidFill>
+          </a:ln>
+          <a:effectLst/>
+        </p:spPr>
+        <p:style>
+          <a:lnRef idx="1">
+            <a:schemeClr val="accent2"/>
+          </a:lnRef>
+          <a:fillRef idx="2">
+            <a:schemeClr val="accent2"/>
+          </a:fillRef>
+          <a:effectRef idx="1">
+            <a:schemeClr val="accent2"/>
+          </a:effectRef>
+          <a:fontRef idx="minor">
+            <a:schemeClr val="dk1"/>
+          </a:fontRef>
+        </p:style>
+        <p:txBody>
+          <a:bodyPr rtlCol="0" anchor="ctr"/>
+          <a:lstStyle/>
+          <a:p>
+            <a:pPr algn="ctr"/>
+            <a:r>
+              <a:rPr lang="en-US" sz="1600" dirty="0">
+                <a:solidFill>
+                  <a:schemeClr val="bg1"/>
+                </a:solidFill>
+              </a:rPr>
+              <a:t>:</a:t>
+            </a:r>
+            <a:r>
+              <a:rPr lang="en-US" sz="1600" dirty="0" err="1">
+                <a:solidFill>
+                  <a:schemeClr val="bg1"/>
+                </a:solidFill>
+              </a:rPr>
+              <a:t>CommandResult</a:t>
+            </a:r>
+            <a:endParaRPr lang="en-SG" sz="1600" dirty="0">
+              <a:solidFill>
+                <a:schemeClr val="bg1"/>
+              </a:solidFill>
+            </a:endParaRPr>
+          </a:p>
+        </p:txBody>
+      </p:sp>
+      <p:cxnSp>
+        <p:nvCxnSpPr>
+          <p:cNvPr id="70" name="Straight Connector 69">
+            <a:extLst>
+              <a:ext uri="{FF2B5EF4-FFF2-40B4-BE49-F238E27FC236}">
+                <a16:creationId xmlns:a16="http://schemas.microsoft.com/office/drawing/2014/main" id="{26D02898-B6A4-4197-81F2-9BB45A9BDB88}"/>
+              </a:ext>
+            </a:extLst>
+          </p:cNvPr>
+          <p:cNvCxnSpPr>
+            <a:cxnSpLocks/>
+          </p:cNvCxnSpPr>
+          <p:nvPr/>
+        </p:nvCxnSpPr>
+        <p:spPr>
+          <a:xfrm>
+            <a:off x="9063633" y="2573471"/>
+            <a:ext cx="0" cy="3674929"/>
+          </a:xfrm>
+          <a:prstGeom prst="line">
+            <a:avLst/>
+          </a:prstGeom>
+          <a:ln w="19050">
+            <a:solidFill>
+              <a:srgbClr val="0070C0"/>
+            </a:solidFill>
+            <a:prstDash val="sysDash"/>
+          </a:ln>
+          <a:effectLst/>
+        </p:spPr>
+        <p:style>
+          <a:lnRef idx="1">
+            <a:schemeClr val="accent1"/>
+          </a:lnRef>
+          <a:fillRef idx="2">
+            <a:schemeClr val="accent1"/>
+          </a:fillRef>
+          <a:effectRef idx="1">
+            <a:schemeClr val="accent1"/>
+          </a:effectRef>
+          <a:fontRef idx="minor">
+            <a:schemeClr val="dk1"/>
+          </a:fontRef>
+        </p:style>
+      </p:cxnSp>
+      <p:sp>
+        <p:nvSpPr>
+          <p:cNvPr id="71" name="Rectangle 70">
+            <a:extLst>
+              <a:ext uri="{FF2B5EF4-FFF2-40B4-BE49-F238E27FC236}">
+                <a16:creationId xmlns:a16="http://schemas.microsoft.com/office/drawing/2014/main" id="{5C1256EF-2C1F-4783-AA3C-55A58E635ADF}"/>
+              </a:ext>
+            </a:extLst>
+          </p:cNvPr>
+          <p:cNvSpPr/>
+          <p:nvPr/>
+        </p:nvSpPr>
+        <p:spPr>
+          <a:xfrm>
+            <a:off x="8991625" y="5791207"/>
+            <a:ext cx="152376" cy="380993"/>
+          </a:xfrm>
+          <a:prstGeom prst="rect">
+            <a:avLst/>
+          </a:prstGeom>
+          <a:solidFill>
+            <a:srgbClr val="0070C0"/>
+          </a:solidFill>
+          <a:ln>
+            <a:solidFill>
+              <a:srgbClr val="0070C0"/>
+            </a:solidFill>
+          </a:ln>
+          <a:effectLst/>
+        </p:spPr>
+        <p:style>
+          <a:lnRef idx="1">
+            <a:schemeClr val="accent3"/>
+          </a:lnRef>
+          <a:fillRef idx="2">
+            <a:schemeClr val="accent3"/>
+          </a:fillRef>
+          <a:effectRef idx="1">
+            <a:schemeClr val="accent3"/>
+          </a:effectRef>
+          <a:fontRef idx="minor">
+            <a:schemeClr val="dk1"/>
+          </a:fontRef>
+        </p:style>
+        <p:txBody>
+          <a:bodyPr rtlCol="0" anchor="ctr"/>
+          <a:lstStyle/>
+          <a:p>
+            <a:pPr algn="ctr"/>
+            <a:endParaRPr lang="en-SG" sz="1400">
+              <a:solidFill>
+                <a:schemeClr val="dk1"/>
+              </a:solidFill>
+            </a:endParaRPr>
+          </a:p>
+        </p:txBody>
+      </p:sp>
+      <p:cxnSp>
+        <p:nvCxnSpPr>
+          <p:cNvPr id="75" name="Straight Arrow Connector 74">
+            <a:extLst>
+              <a:ext uri="{FF2B5EF4-FFF2-40B4-BE49-F238E27FC236}">
+                <a16:creationId xmlns:a16="http://schemas.microsoft.com/office/drawing/2014/main" id="{F5078C6A-09A9-4E4A-983A-7FCD46644273}"/>
+              </a:ext>
+            </a:extLst>
+          </p:cNvPr>
+          <p:cNvCxnSpPr>
+            <a:cxnSpLocks/>
+          </p:cNvCxnSpPr>
+          <p:nvPr/>
+        </p:nvCxnSpPr>
+        <p:spPr>
+          <a:xfrm>
+            <a:off x="7407533" y="5791200"/>
+            <a:ext cx="1584092" cy="7"/>
+          </a:xfrm>
+          <a:prstGeom prst="straightConnector1">
+            <a:avLst/>
+          </a:prstGeom>
+          <a:ln w="19050">
+            <a:solidFill>
+              <a:srgbClr val="0070C0"/>
+            </a:solidFill>
+            <a:tailEnd type="arrow"/>
+          </a:ln>
+        </p:spPr>
+        <p:style>
+          <a:lnRef idx="1">
+            <a:schemeClr val="accent1"/>
+          </a:lnRef>
+          <a:fillRef idx="0">
+            <a:schemeClr val="accent1"/>
+          </a:fillRef>
+          <a:effectRef idx="0">
+            <a:schemeClr val="accent1"/>
+          </a:effectRef>
+          <a:fontRef idx="minor">
+            <a:schemeClr val="tx1"/>
+          </a:fontRef>
+        </p:style>
+      </p:cxnSp>
+      <p:sp>
+        <p:nvSpPr>
+          <p:cNvPr id="78" name="TextBox 77">
+            <a:extLst>
+              <a:ext uri="{FF2B5EF4-FFF2-40B4-BE49-F238E27FC236}">
+                <a16:creationId xmlns:a16="http://schemas.microsoft.com/office/drawing/2014/main" id="{4242BE08-165C-4A1A-93B2-29D601AE3FBC}"/>
+              </a:ext>
+            </a:extLst>
+          </p:cNvPr>
+          <p:cNvSpPr txBox="1"/>
+          <p:nvPr/>
+        </p:nvSpPr>
+        <p:spPr>
+          <a:xfrm>
+            <a:off x="7514312" y="5817513"/>
+            <a:ext cx="1324888" cy="215444"/>
+          </a:xfrm>
+          <a:prstGeom prst="rect">
+            <a:avLst/>
+          </a:prstGeom>
+          <a:noFill/>
+        </p:spPr>
+        <p:txBody>
+          <a:bodyPr wrap="square" lIns="0" tIns="0" rIns="0" bIns="0" rtlCol="0">
+            <a:spAutoFit/>
+          </a:bodyPr>
+          <a:lstStyle/>
+          <a:p>
+            <a:pPr algn="ctr"/>
+            <a:r>
+              <a:rPr lang="en-US" sz="1400" dirty="0" err="1">
+                <a:solidFill>
+                  <a:srgbClr val="0070C0"/>
+                </a:solidFill>
+              </a:rPr>
+              <a:t>CommandResult</a:t>
             </a:r>
             <a:r>
               <a:rPr lang="en-US" sz="1400" dirty="0">
@@ -4719,6 +6162,96 @@
           </a:p>
         </p:txBody>
       </p:sp>
+      <p:cxnSp>
+        <p:nvCxnSpPr>
+          <p:cNvPr id="79" name="Straight Arrow Connector 78">
+            <a:extLst>
+              <a:ext uri="{FF2B5EF4-FFF2-40B4-BE49-F238E27FC236}">
+                <a16:creationId xmlns:a16="http://schemas.microsoft.com/office/drawing/2014/main" id="{023DB260-C27D-4139-A601-B8E1AA140385}"/>
+              </a:ext>
+            </a:extLst>
+          </p:cNvPr>
+          <p:cNvCxnSpPr>
+            <a:cxnSpLocks/>
+          </p:cNvCxnSpPr>
+          <p:nvPr/>
+        </p:nvCxnSpPr>
+        <p:spPr>
+          <a:xfrm flipH="1">
+            <a:off x="7391377" y="6172200"/>
+            <a:ext cx="1600248" cy="0"/>
+          </a:xfrm>
+          <a:prstGeom prst="straightConnector1">
+            <a:avLst/>
+          </a:prstGeom>
+          <a:ln w="19050">
+            <a:solidFill>
+              <a:srgbClr val="0070C0"/>
+            </a:solidFill>
+            <a:prstDash val="sysDash"/>
+            <a:tailEnd type="arrow"/>
+          </a:ln>
+        </p:spPr>
+        <p:style>
+          <a:lnRef idx="1">
+            <a:schemeClr val="accent1"/>
+          </a:lnRef>
+          <a:fillRef idx="0">
+            <a:schemeClr val="accent1"/>
+          </a:fillRef>
+          <a:effectRef idx="0">
+            <a:schemeClr val="accent1"/>
+          </a:effectRef>
+          <a:fontRef idx="minor">
+            <a:schemeClr val="tx1"/>
+          </a:fontRef>
+        </p:style>
+      </p:cxnSp>
+      <p:cxnSp>
+        <p:nvCxnSpPr>
+          <p:cNvPr id="84" name="Straight Arrow Connector 83">
+            <a:extLst>
+              <a:ext uri="{FF2B5EF4-FFF2-40B4-BE49-F238E27FC236}">
+                <a16:creationId xmlns:a16="http://schemas.microsoft.com/office/drawing/2014/main" id="{F34FF2A5-3D46-4D83-BECC-EEDA2A2B2F86}"/>
+              </a:ext>
+            </a:extLst>
+          </p:cNvPr>
+          <p:cNvCxnSpPr>
+            <a:cxnSpLocks/>
+          </p:cNvCxnSpPr>
+          <p:nvPr/>
+        </p:nvCxnSpPr>
+        <p:spPr>
+          <a:xfrm flipH="1">
+            <a:off x="1791060" y="6321972"/>
+            <a:ext cx="5439605" cy="0"/>
+          </a:xfrm>
+          <a:prstGeom prst="straightConnector1">
+            <a:avLst/>
+          </a:prstGeom>
+          <a:ln w="19050">
+            <a:solidFill>
+              <a:srgbClr val="0070C0"/>
+            </a:solidFill>
+            <a:prstDash val="sysDash"/>
+            <a:tailEnd type="arrow"/>
+          </a:ln>
+        </p:spPr>
+        <p:style>
+          <a:lnRef idx="1">
+            <a:schemeClr val="accent1"/>
+          </a:lnRef>
+          <a:fillRef idx="0">
+            <a:schemeClr val="accent1"/>
+          </a:fillRef>
+          <a:effectRef idx="0">
+            <a:schemeClr val="accent1"/>
+          </a:effectRef>
+          <a:fontRef idx="minor">
+            <a:schemeClr val="tx1"/>
+          </a:fontRef>
+        </p:style>
+      </p:cxnSp>
     </p:spTree>
     <p:extLst>
       <p:ext uri="{BB962C8B-B14F-4D97-AF65-F5344CB8AC3E}">

</xml_diff>

<commit_message>
Update view month sequence diagram
</commit_message>
<xml_diff>
--- a/docs/diagrams/ViewMonthSequenceDiagram.pptx
+++ b/docs/diagrams/ViewMonthSequenceDiagram.pptx
@@ -208,7 +208,7 @@
           <a:p>
             <a:fld id="{F5CC4B3F-88C1-4FFA-B1B6-F41C21DC6924}" type="datetimeFigureOut">
               <a:rPr lang="en-US" smtClean="0"/>
-              <a:t>4/13/2019</a:t>
+              <a:t>4/14/2019</a:t>
             </a:fld>
             <a:endParaRPr lang="en-US"/>
           </a:p>
@@ -738,7 +738,7 @@
           <a:p>
             <a:fld id="{78C97017-6FC3-485B-9764-EAC9E56C1D49}" type="datetimeFigureOut">
               <a:rPr lang="en-US" smtClean="0"/>
-              <a:t>4/13/2019</a:t>
+              <a:t>4/14/2019</a:t>
             </a:fld>
             <a:endParaRPr lang="en-US"/>
           </a:p>
@@ -906,7 +906,7 @@
           <a:p>
             <a:fld id="{78C97017-6FC3-485B-9764-EAC9E56C1D49}" type="datetimeFigureOut">
               <a:rPr lang="en-US" smtClean="0"/>
-              <a:t>4/13/2019</a:t>
+              <a:t>4/14/2019</a:t>
             </a:fld>
             <a:endParaRPr lang="en-US"/>
           </a:p>
@@ -1084,7 +1084,7 @@
           <a:p>
             <a:fld id="{78C97017-6FC3-485B-9764-EAC9E56C1D49}" type="datetimeFigureOut">
               <a:rPr lang="en-US" smtClean="0"/>
-              <a:t>4/13/2019</a:t>
+              <a:t>4/14/2019</a:t>
             </a:fld>
             <a:endParaRPr lang="en-US"/>
           </a:p>
@@ -1252,7 +1252,7 @@
           <a:p>
             <a:fld id="{78C97017-6FC3-485B-9764-EAC9E56C1D49}" type="datetimeFigureOut">
               <a:rPr lang="en-US" smtClean="0"/>
-              <a:t>4/13/2019</a:t>
+              <a:t>4/14/2019</a:t>
             </a:fld>
             <a:endParaRPr lang="en-US"/>
           </a:p>
@@ -1497,7 +1497,7 @@
           <a:p>
             <a:fld id="{78C97017-6FC3-485B-9764-EAC9E56C1D49}" type="datetimeFigureOut">
               <a:rPr lang="en-US" smtClean="0"/>
-              <a:t>4/13/2019</a:t>
+              <a:t>4/14/2019</a:t>
             </a:fld>
             <a:endParaRPr lang="en-US"/>
           </a:p>
@@ -1782,7 +1782,7 @@
           <a:p>
             <a:fld id="{78C97017-6FC3-485B-9764-EAC9E56C1D49}" type="datetimeFigureOut">
               <a:rPr lang="en-US" smtClean="0"/>
-              <a:t>4/13/2019</a:t>
+              <a:t>4/14/2019</a:t>
             </a:fld>
             <a:endParaRPr lang="en-US"/>
           </a:p>
@@ -2201,7 +2201,7 @@
           <a:p>
             <a:fld id="{78C97017-6FC3-485B-9764-EAC9E56C1D49}" type="datetimeFigureOut">
               <a:rPr lang="en-US" smtClean="0"/>
-              <a:t>4/13/2019</a:t>
+              <a:t>4/14/2019</a:t>
             </a:fld>
             <a:endParaRPr lang="en-US"/>
           </a:p>
@@ -2318,7 +2318,7 @@
           <a:p>
             <a:fld id="{78C97017-6FC3-485B-9764-EAC9E56C1D49}" type="datetimeFigureOut">
               <a:rPr lang="en-US" smtClean="0"/>
-              <a:t>4/13/2019</a:t>
+              <a:t>4/14/2019</a:t>
             </a:fld>
             <a:endParaRPr lang="en-US"/>
           </a:p>
@@ -2413,7 +2413,7 @@
           <a:p>
             <a:fld id="{78C97017-6FC3-485B-9764-EAC9E56C1D49}" type="datetimeFigureOut">
               <a:rPr lang="en-US" smtClean="0"/>
-              <a:t>4/13/2019</a:t>
+              <a:t>4/14/2019</a:t>
             </a:fld>
             <a:endParaRPr lang="en-US"/>
           </a:p>
@@ -2688,7 +2688,7 @@
           <a:p>
             <a:fld id="{78C97017-6FC3-485B-9764-EAC9E56C1D49}" type="datetimeFigureOut">
               <a:rPr lang="en-US" smtClean="0"/>
-              <a:t>4/13/2019</a:t>
+              <a:t>4/14/2019</a:t>
             </a:fld>
             <a:endParaRPr lang="en-US"/>
           </a:p>
@@ -2940,7 +2940,7 @@
           <a:p>
             <a:fld id="{78C97017-6FC3-485B-9764-EAC9E56C1D49}" type="datetimeFigureOut">
               <a:rPr lang="en-US" smtClean="0"/>
-              <a:t>4/13/2019</a:t>
+              <a:t>4/14/2019</a:t>
             </a:fld>
             <a:endParaRPr lang="en-US"/>
           </a:p>
@@ -3151,7 +3151,7 @@
           <a:p>
             <a:fld id="{78C97017-6FC3-485B-9764-EAC9E56C1D49}" type="datetimeFigureOut">
               <a:rPr lang="en-US" smtClean="0"/>
-              <a:t>4/13/2019</a:t>
+              <a:t>4/14/2019</a:t>
             </a:fld>
             <a:endParaRPr lang="en-US"/>
           </a:p>
@@ -4644,51 +4644,6 @@
           </a:fontRef>
         </p:style>
       </p:cxnSp>
-      <p:cxnSp>
-        <p:nvCxnSpPr>
-          <p:cNvPr id="30" name="Curved Connector 12">
-            <a:extLst>
-              <a:ext uri="{FF2B5EF4-FFF2-40B4-BE49-F238E27FC236}">
-                <a16:creationId xmlns:a16="http://schemas.microsoft.com/office/drawing/2014/main" id="{B3F8C2BB-1F84-4A72-9799-265A2D1B92E0}"/>
-              </a:ext>
-            </a:extLst>
-          </p:cNvPr>
-          <p:cNvCxnSpPr/>
-          <p:nvPr/>
-        </p:nvCxnSpPr>
-        <p:spPr>
-          <a:xfrm rot="16200000" flipH="1">
-            <a:off x="7393557" y="5311978"/>
-            <a:ext cx="156923" cy="76200"/>
-          </a:xfrm>
-          <a:prstGeom prst="curvedConnector4">
-            <a:avLst>
-              <a:gd name="adj1" fmla="val -145677"/>
-              <a:gd name="adj2" fmla="val 400000"/>
-            </a:avLst>
-          </a:prstGeom>
-          <a:ln>
-            <a:solidFill>
-              <a:srgbClr val="0070C0"/>
-            </a:solidFill>
-            <a:tailEnd type="triangle"/>
-          </a:ln>
-        </p:spPr>
-        <p:style>
-          <a:lnRef idx="1">
-            <a:schemeClr val="accent1"/>
-          </a:lnRef>
-          <a:fillRef idx="0">
-            <a:schemeClr val="accent1"/>
-          </a:fillRef>
-          <a:effectRef idx="0">
-            <a:schemeClr val="accent1"/>
-          </a:effectRef>
-          <a:fontRef idx="minor">
-            <a:schemeClr val="tx1"/>
-          </a:fontRef>
-        </p:style>
-      </p:cxnSp>
       <p:sp>
         <p:nvSpPr>
           <p:cNvPr id="31" name="TextBox 30">
@@ -6252,6 +6207,204 @@
           </a:fontRef>
         </p:style>
       </p:cxnSp>
+      <p:sp>
+        <p:nvSpPr>
+          <p:cNvPr id="72" name="Freeform 58">
+            <a:extLst>
+              <a:ext uri="{FF2B5EF4-FFF2-40B4-BE49-F238E27FC236}">
+                <a16:creationId xmlns:a16="http://schemas.microsoft.com/office/drawing/2014/main" id="{33816411-FFBA-41E9-A4E2-9335B21BB43E}"/>
+              </a:ext>
+            </a:extLst>
+          </p:cNvPr>
+          <p:cNvSpPr/>
+          <p:nvPr/>
+        </p:nvSpPr>
+        <p:spPr>
+          <a:xfrm rot="18999002" flipV="1">
+            <a:off x="7408674" y="5146931"/>
+            <a:ext cx="167452" cy="116880"/>
+          </a:xfrm>
+          <a:custGeom>
+            <a:avLst/>
+            <a:gdLst>
+              <a:gd name="connsiteX0" fmla="*/ 0 w 226400"/>
+              <a:gd name="connsiteY0" fmla="*/ 32920 h 171466"/>
+              <a:gd name="connsiteX1" fmla="*/ 157018 w 226400"/>
+              <a:gd name="connsiteY1" fmla="*/ 5211 h 171466"/>
+              <a:gd name="connsiteX2" fmla="*/ 221673 w 226400"/>
+              <a:gd name="connsiteY2" fmla="*/ 125284 h 171466"/>
+              <a:gd name="connsiteX3" fmla="*/ 36945 w 226400"/>
+              <a:gd name="connsiteY3" fmla="*/ 171466 h 171466"/>
+            </a:gdLst>
+            <a:ahLst/>
+            <a:cxnLst>
+              <a:cxn ang="0">
+                <a:pos x="connsiteX0" y="connsiteY0"/>
+              </a:cxn>
+              <a:cxn ang="0">
+                <a:pos x="connsiteX1" y="connsiteY1"/>
+              </a:cxn>
+              <a:cxn ang="0">
+                <a:pos x="connsiteX2" y="connsiteY2"/>
+              </a:cxn>
+              <a:cxn ang="0">
+                <a:pos x="connsiteX3" y="connsiteY3"/>
+              </a:cxn>
+            </a:cxnLst>
+            <a:rect l="l" t="t" r="r" b="b"/>
+            <a:pathLst>
+              <a:path w="226400" h="171466">
+                <a:moveTo>
+                  <a:pt x="0" y="32920"/>
+                </a:moveTo>
+                <a:cubicBezTo>
+                  <a:pt x="60036" y="11368"/>
+                  <a:pt x="120073" y="-10183"/>
+                  <a:pt x="157018" y="5211"/>
+                </a:cubicBezTo>
+                <a:cubicBezTo>
+                  <a:pt x="193963" y="20605"/>
+                  <a:pt x="241685" y="97575"/>
+                  <a:pt x="221673" y="125284"/>
+                </a:cubicBezTo>
+                <a:cubicBezTo>
+                  <a:pt x="201661" y="152993"/>
+                  <a:pt x="119303" y="162229"/>
+                  <a:pt x="36945" y="171466"/>
+                </a:cubicBezTo>
+              </a:path>
+            </a:pathLst>
+          </a:custGeom>
+          <a:ln w="19050">
+            <a:solidFill>
+              <a:srgbClr val="0070C0"/>
+            </a:solidFill>
+            <a:headEnd type="arrow" w="med" len="med"/>
+            <a:tailEnd type="none" w="med" len="med"/>
+          </a:ln>
+        </p:spPr>
+        <p:style>
+          <a:lnRef idx="1">
+            <a:schemeClr val="accent1"/>
+          </a:lnRef>
+          <a:fillRef idx="0">
+            <a:schemeClr val="accent1"/>
+          </a:fillRef>
+          <a:effectRef idx="0">
+            <a:schemeClr val="accent1"/>
+          </a:effectRef>
+          <a:fontRef idx="minor">
+            <a:schemeClr val="tx1"/>
+          </a:fontRef>
+        </p:style>
+        <p:txBody>
+          <a:bodyPr rtlCol="0" anchor="ctr"/>
+          <a:lstStyle/>
+          <a:p>
+            <a:pPr algn="ctr"/>
+            <a:endParaRPr lang="en-SG" dirty="0"/>
+          </a:p>
+        </p:txBody>
+      </p:sp>
+      <p:sp>
+        <p:nvSpPr>
+          <p:cNvPr id="73" name="Freeform 58">
+            <a:extLst>
+              <a:ext uri="{FF2B5EF4-FFF2-40B4-BE49-F238E27FC236}">
+                <a16:creationId xmlns:a16="http://schemas.microsoft.com/office/drawing/2014/main" id="{4EC3C171-5BD9-4C28-BC93-1B548FC2702A}"/>
+              </a:ext>
+            </a:extLst>
+          </p:cNvPr>
+          <p:cNvSpPr/>
+          <p:nvPr/>
+        </p:nvSpPr>
+        <p:spPr>
+          <a:xfrm rot="792488" flipV="1">
+            <a:off x="7430586" y="5537402"/>
+            <a:ext cx="167452" cy="116880"/>
+          </a:xfrm>
+          <a:custGeom>
+            <a:avLst/>
+            <a:gdLst>
+              <a:gd name="connsiteX0" fmla="*/ 0 w 226400"/>
+              <a:gd name="connsiteY0" fmla="*/ 32920 h 171466"/>
+              <a:gd name="connsiteX1" fmla="*/ 157018 w 226400"/>
+              <a:gd name="connsiteY1" fmla="*/ 5211 h 171466"/>
+              <a:gd name="connsiteX2" fmla="*/ 221673 w 226400"/>
+              <a:gd name="connsiteY2" fmla="*/ 125284 h 171466"/>
+              <a:gd name="connsiteX3" fmla="*/ 36945 w 226400"/>
+              <a:gd name="connsiteY3" fmla="*/ 171466 h 171466"/>
+            </a:gdLst>
+            <a:ahLst/>
+            <a:cxnLst>
+              <a:cxn ang="0">
+                <a:pos x="connsiteX0" y="connsiteY0"/>
+              </a:cxn>
+              <a:cxn ang="0">
+                <a:pos x="connsiteX1" y="connsiteY1"/>
+              </a:cxn>
+              <a:cxn ang="0">
+                <a:pos x="connsiteX2" y="connsiteY2"/>
+              </a:cxn>
+              <a:cxn ang="0">
+                <a:pos x="connsiteX3" y="connsiteY3"/>
+              </a:cxn>
+            </a:cxnLst>
+            <a:rect l="l" t="t" r="r" b="b"/>
+            <a:pathLst>
+              <a:path w="226400" h="171466">
+                <a:moveTo>
+                  <a:pt x="0" y="32920"/>
+                </a:moveTo>
+                <a:cubicBezTo>
+                  <a:pt x="60036" y="11368"/>
+                  <a:pt x="120073" y="-10183"/>
+                  <a:pt x="157018" y="5211"/>
+                </a:cubicBezTo>
+                <a:cubicBezTo>
+                  <a:pt x="193963" y="20605"/>
+                  <a:pt x="241685" y="97575"/>
+                  <a:pt x="221673" y="125284"/>
+                </a:cubicBezTo>
+                <a:cubicBezTo>
+                  <a:pt x="201661" y="152993"/>
+                  <a:pt x="119303" y="162229"/>
+                  <a:pt x="36945" y="171466"/>
+                </a:cubicBezTo>
+              </a:path>
+            </a:pathLst>
+          </a:custGeom>
+          <a:ln w="19050">
+            <a:solidFill>
+              <a:srgbClr val="0070C0"/>
+            </a:solidFill>
+            <a:headEnd type="arrow" w="med" len="med"/>
+            <a:tailEnd type="none" w="med" len="med"/>
+          </a:ln>
+        </p:spPr>
+        <p:style>
+          <a:lnRef idx="1">
+            <a:schemeClr val="accent1"/>
+          </a:lnRef>
+          <a:fillRef idx="0">
+            <a:schemeClr val="accent1"/>
+          </a:fillRef>
+          <a:effectRef idx="0">
+            <a:schemeClr val="accent1"/>
+          </a:effectRef>
+          <a:fontRef idx="minor">
+            <a:schemeClr val="tx1"/>
+          </a:fontRef>
+        </p:style>
+        <p:txBody>
+          <a:bodyPr rtlCol="0" anchor="ctr"/>
+          <a:lstStyle/>
+          <a:p>
+            <a:pPr algn="ctr"/>
+            <a:endParaRPr lang="en-SG" dirty="0"/>
+          </a:p>
+        </p:txBody>
+      </p:sp>
     </p:spTree>
     <p:extLst>
       <p:ext uri="{BB962C8B-B14F-4D97-AF65-F5344CB8AC3E}">

</xml_diff>